<commit_message>
add lab 7 & solution
</commit_message>
<xml_diff>
--- a/Slides/Non-Functional requirements.pptx
+++ b/Slides/Non-Functional requirements.pptx
@@ -281,7 +281,7 @@
           <a:p>
             <a:fld id="{A0E8587E-A10C-43A0-9408-43FACFB43BA8}" type="datetimeFigureOut">
               <a:rPr lang="en-PK" smtClean="0"/>
-              <a:t>14/09/2023</a:t>
+              <a:t>10/25/2023</a:t>
             </a:fld>
             <a:endParaRPr lang="en-PK"/>
           </a:p>
@@ -481,7 +481,7 @@
           <a:p>
             <a:fld id="{A0E8587E-A10C-43A0-9408-43FACFB43BA8}" type="datetimeFigureOut">
               <a:rPr lang="en-PK" smtClean="0"/>
-              <a:t>14/09/2023</a:t>
+              <a:t>10/25/2023</a:t>
             </a:fld>
             <a:endParaRPr lang="en-PK"/>
           </a:p>
@@ -691,7 +691,7 @@
           <a:p>
             <a:fld id="{A0E8587E-A10C-43A0-9408-43FACFB43BA8}" type="datetimeFigureOut">
               <a:rPr lang="en-PK" smtClean="0"/>
-              <a:t>14/09/2023</a:t>
+              <a:t>10/25/2023</a:t>
             </a:fld>
             <a:endParaRPr lang="en-PK"/>
           </a:p>
@@ -891,7 +891,7 @@
           <a:p>
             <a:fld id="{A0E8587E-A10C-43A0-9408-43FACFB43BA8}" type="datetimeFigureOut">
               <a:rPr lang="en-PK" smtClean="0"/>
-              <a:t>14/09/2023</a:t>
+              <a:t>10/25/2023</a:t>
             </a:fld>
             <a:endParaRPr lang="en-PK"/>
           </a:p>
@@ -1167,7 +1167,7 @@
           <a:p>
             <a:fld id="{A0E8587E-A10C-43A0-9408-43FACFB43BA8}" type="datetimeFigureOut">
               <a:rPr lang="en-PK" smtClean="0"/>
-              <a:t>14/09/2023</a:t>
+              <a:t>10/25/2023</a:t>
             </a:fld>
             <a:endParaRPr lang="en-PK"/>
           </a:p>
@@ -1435,7 +1435,7 @@
           <a:p>
             <a:fld id="{A0E8587E-A10C-43A0-9408-43FACFB43BA8}" type="datetimeFigureOut">
               <a:rPr lang="en-PK" smtClean="0"/>
-              <a:t>14/09/2023</a:t>
+              <a:t>10/25/2023</a:t>
             </a:fld>
             <a:endParaRPr lang="en-PK"/>
           </a:p>
@@ -1850,7 +1850,7 @@
           <a:p>
             <a:fld id="{A0E8587E-A10C-43A0-9408-43FACFB43BA8}" type="datetimeFigureOut">
               <a:rPr lang="en-PK" smtClean="0"/>
-              <a:t>14/09/2023</a:t>
+              <a:t>10/25/2023</a:t>
             </a:fld>
             <a:endParaRPr lang="en-PK"/>
           </a:p>
@@ -1992,7 +1992,7 @@
           <a:p>
             <a:fld id="{A0E8587E-A10C-43A0-9408-43FACFB43BA8}" type="datetimeFigureOut">
               <a:rPr lang="en-PK" smtClean="0"/>
-              <a:t>14/09/2023</a:t>
+              <a:t>10/25/2023</a:t>
             </a:fld>
             <a:endParaRPr lang="en-PK"/>
           </a:p>
@@ -2105,7 +2105,7 @@
           <a:p>
             <a:fld id="{A0E8587E-A10C-43A0-9408-43FACFB43BA8}" type="datetimeFigureOut">
               <a:rPr lang="en-PK" smtClean="0"/>
-              <a:t>14/09/2023</a:t>
+              <a:t>10/25/2023</a:t>
             </a:fld>
             <a:endParaRPr lang="en-PK"/>
           </a:p>
@@ -2418,7 +2418,7 @@
           <a:p>
             <a:fld id="{A0E8587E-A10C-43A0-9408-43FACFB43BA8}" type="datetimeFigureOut">
               <a:rPr lang="en-PK" smtClean="0"/>
-              <a:t>14/09/2023</a:t>
+              <a:t>10/25/2023</a:t>
             </a:fld>
             <a:endParaRPr lang="en-PK"/>
           </a:p>
@@ -2707,7 +2707,7 @@
           <a:p>
             <a:fld id="{A0E8587E-A10C-43A0-9408-43FACFB43BA8}" type="datetimeFigureOut">
               <a:rPr lang="en-PK" smtClean="0"/>
-              <a:t>14/09/2023</a:t>
+              <a:t>10/25/2023</a:t>
             </a:fld>
             <a:endParaRPr lang="en-PK"/>
           </a:p>
@@ -2950,7 +2950,7 @@
           <a:p>
             <a:fld id="{A0E8587E-A10C-43A0-9408-43FACFB43BA8}" type="datetimeFigureOut">
               <a:rPr lang="en-PK" smtClean="0"/>
-              <a:t>14/09/2023</a:t>
+              <a:t>10/25/2023</a:t>
             </a:fld>
             <a:endParaRPr lang="en-PK"/>
           </a:p>

</xml_diff>